<commit_message>
correction liens maquette fichier non definitif
</commit_message>
<xml_diff>
--- a/maquetteWeb/maquetteProposition.pptx
+++ b/maquetteWeb/maquetteProposition.pptx
@@ -112,6 +112,11 @@
       </a:defRPr>
     </a:lvl9pPr>
   </p:defaultTextStyle>
+  <p:extLst>
+    <p:ext uri="{EFAFB233-063F-42B5-8137-9DF3F51BA10A}">
+      <p15:sldGuideLst xmlns:p15="http://schemas.microsoft.com/office/powerpoint/2012/main"/>
+    </p:ext>
+  </p:extLst>
 </p:presentation>
 </file>
 
@@ -266,7 +271,7 @@
           <a:p>
             <a:fld id="{1B2E41C0-D1E6-40B7-81C8-24595DCDEEF4}" type="datetimeFigureOut">
               <a:rPr lang="fr-FR" smtClean="0"/>
-              <a:t>18/11/2017</a:t>
+              <a:t>20/11/2017</a:t>
             </a:fld>
             <a:endParaRPr lang="fr-FR"/>
           </a:p>
@@ -464,7 +469,7 @@
           <a:p>
             <a:fld id="{1B2E41C0-D1E6-40B7-81C8-24595DCDEEF4}" type="datetimeFigureOut">
               <a:rPr lang="fr-FR" smtClean="0"/>
-              <a:t>18/11/2017</a:t>
+              <a:t>20/11/2017</a:t>
             </a:fld>
             <a:endParaRPr lang="fr-FR"/>
           </a:p>
@@ -672,7 +677,7 @@
           <a:p>
             <a:fld id="{1B2E41C0-D1E6-40B7-81C8-24595DCDEEF4}" type="datetimeFigureOut">
               <a:rPr lang="fr-FR" smtClean="0"/>
-              <a:t>18/11/2017</a:t>
+              <a:t>20/11/2017</a:t>
             </a:fld>
             <a:endParaRPr lang="fr-FR"/>
           </a:p>
@@ -2512,7 +2517,7 @@
           <a:p>
             <a:fld id="{1B2E41C0-D1E6-40B7-81C8-24595DCDEEF4}" type="datetimeFigureOut">
               <a:rPr lang="fr-FR" smtClean="0"/>
-              <a:t>18/11/2017</a:t>
+              <a:t>20/11/2017</a:t>
             </a:fld>
             <a:endParaRPr lang="fr-FR"/>
           </a:p>
@@ -2787,7 +2792,7 @@
           <a:p>
             <a:fld id="{1B2E41C0-D1E6-40B7-81C8-24595DCDEEF4}" type="datetimeFigureOut">
               <a:rPr lang="fr-FR" smtClean="0"/>
-              <a:t>18/11/2017</a:t>
+              <a:t>20/11/2017</a:t>
             </a:fld>
             <a:endParaRPr lang="fr-FR"/>
           </a:p>
@@ -3052,7 +3057,7 @@
           <a:p>
             <a:fld id="{1B2E41C0-D1E6-40B7-81C8-24595DCDEEF4}" type="datetimeFigureOut">
               <a:rPr lang="fr-FR" smtClean="0"/>
-              <a:t>18/11/2017</a:t>
+              <a:t>20/11/2017</a:t>
             </a:fld>
             <a:endParaRPr lang="fr-FR"/>
           </a:p>
@@ -3464,7 +3469,7 @@
           <a:p>
             <a:fld id="{1B2E41C0-D1E6-40B7-81C8-24595DCDEEF4}" type="datetimeFigureOut">
               <a:rPr lang="fr-FR" smtClean="0"/>
-              <a:t>18/11/2017</a:t>
+              <a:t>20/11/2017</a:t>
             </a:fld>
             <a:endParaRPr lang="fr-FR"/>
           </a:p>
@@ -3605,7 +3610,7 @@
           <a:p>
             <a:fld id="{1B2E41C0-D1E6-40B7-81C8-24595DCDEEF4}" type="datetimeFigureOut">
               <a:rPr lang="fr-FR" smtClean="0"/>
-              <a:t>18/11/2017</a:t>
+              <a:t>20/11/2017</a:t>
             </a:fld>
             <a:endParaRPr lang="fr-FR"/>
           </a:p>
@@ -3718,7 +3723,7 @@
           <a:p>
             <a:fld id="{1B2E41C0-D1E6-40B7-81C8-24595DCDEEF4}" type="datetimeFigureOut">
               <a:rPr lang="fr-FR" smtClean="0"/>
-              <a:t>18/11/2017</a:t>
+              <a:t>20/11/2017</a:t>
             </a:fld>
             <a:endParaRPr lang="fr-FR"/>
           </a:p>
@@ -4029,7 +4034,7 @@
           <a:p>
             <a:fld id="{1B2E41C0-D1E6-40B7-81C8-24595DCDEEF4}" type="datetimeFigureOut">
               <a:rPr lang="fr-FR" smtClean="0"/>
-              <a:t>18/11/2017</a:t>
+              <a:t>20/11/2017</a:t>
             </a:fld>
             <a:endParaRPr lang="fr-FR"/>
           </a:p>
@@ -4317,7 +4322,7 @@
           <a:p>
             <a:fld id="{1B2E41C0-D1E6-40B7-81C8-24595DCDEEF4}" type="datetimeFigureOut">
               <a:rPr lang="fr-FR" smtClean="0"/>
-              <a:t>18/11/2017</a:t>
+              <a:t>20/11/2017</a:t>
             </a:fld>
             <a:endParaRPr lang="fr-FR"/>
           </a:p>
@@ -4558,7 +4563,7 @@
           <a:p>
             <a:fld id="{1B2E41C0-D1E6-40B7-81C8-24595DCDEEF4}" type="datetimeFigureOut">
               <a:rPr lang="fr-FR" smtClean="0"/>
-              <a:t>18/11/2017</a:t>
+              <a:t>20/11/2017</a:t>
             </a:fld>
             <a:endParaRPr lang="fr-FR"/>
           </a:p>
@@ -6869,7 +6874,7 @@
                 <a:latin typeface="Segoe UI" pitchFamily="34" charset="0"/>
                 <a:cs typeface="Segoe UI" pitchFamily="34" charset="0"/>
               </a:rPr>
-              <a:t>Creation de sondage</a:t>
+              <a:t>Creation du sondage</a:t>
             </a:r>
           </a:p>
         </p:txBody>
@@ -20949,61 +20954,61 @@
 
 <file path=customXml/item1.xml><?xml version="1.0" encoding="utf-8"?>
 <Control xmlns="http://schemas.microsoft.com/VisualStudio/2011/storyboarding/control">
-  <Id Name="System.Storyboarding.Backgrounds.WebBrowser" Revision="1" Stencil="System.Storyboarding.Backgrounds" StencilVersion="0.1"/>
+  <Id Name="System.Storyboarding.Common.RadioButtonUnselected" Revision="1" Stencil="System.Storyboarding.Common" StencilVersion="0.1"/>
 </Control>
 </file>
 
 <file path=customXml/item10.xml><?xml version="1.0" encoding="utf-8"?>
 <Control xmlns="http://schemas.microsoft.com/VisualStudio/2011/storyboarding/control">
-  <Id Name="System.Storyboarding.Common.TextArea" Revision="1" Stencil="System.Storyboarding.Common" StencilVersion="0.1"/>
+  <Id Name="System.Storyboarding.Backgrounds.WebBrowser" Revision="1" Stencil="System.Storyboarding.Backgrounds" StencilVersion="0.1"/>
 </Control>
 </file>
 
 <file path=customXml/item11.xml><?xml version="1.0" encoding="utf-8"?>
 <Control xmlns="http://schemas.microsoft.com/VisualStudio/2011/storyboarding/control">
-  <Id Name="System.Storyboarding.Common.TextInput" Revision="1" Stencil="System.Storyboarding.Common" StencilVersion="0.1"/>
+  <Id Name="System.Storyboarding.Common.Button" Revision="1" Stencil="System.Storyboarding.Common" StencilVersion="0.1"/>
 </Control>
 </file>
 
 <file path=customXml/item12.xml><?xml version="1.0" encoding="utf-8"?>
 <Control xmlns="http://schemas.microsoft.com/VisualStudio/2011/storyboarding/control">
-  <Id Name="System.Storyboarding.Common.RadioButtonUnselected" Revision="1" Stencil="System.Storyboarding.Common" StencilVersion="0.1"/>
+  <Id Name="System.Storyboarding.Common.MousePointer" Revision="1" Stencil="System.Storyboarding.Common" StencilVersion="0.1"/>
 </Control>
 </file>
 
 <file path=customXml/item13.xml><?xml version="1.0" encoding="utf-8"?>
 <Control xmlns="http://schemas.microsoft.com/VisualStudio/2011/storyboarding/control">
-  <Id Name="System.Storyboarding.Common.RadioButtonUnselected" Revision="1" Stencil="System.Storyboarding.Common" StencilVersion="0.1"/>
+  <Id Name="System.Storyboarding.Common.SearchBox" Revision="1" Stencil="System.Storyboarding.Common" StencilVersion="0.1"/>
 </Control>
 </file>
 
 <file path=customXml/item14.xml><?xml version="1.0" encoding="utf-8"?>
 <Control xmlns="http://schemas.microsoft.com/VisualStudio/2011/storyboarding/control">
-  <Id Name="System.Storyboarding.Common.Button" Revision="1" Stencil="System.Storyboarding.Common" StencilVersion="0.1"/>
+  <Id Name="System.Storyboarding.Common.SearchBox" Revision="1" Stencil="System.Storyboarding.Common" StencilVersion="0.1"/>
 </Control>
 </file>
 
 <file path=customXml/item15.xml><?xml version="1.0" encoding="utf-8"?>
 <Control xmlns="http://schemas.microsoft.com/VisualStudio/2011/storyboarding/control">
-  <Id Name="System.Storyboarding.Common.Button" Revision="1" Stencil="System.Storyboarding.Common" StencilVersion="0.1"/>
+  <Id Name="System.Storyboarding.Common.TextInput" Revision="1" Stencil="System.Storyboarding.Common" StencilVersion="0.1"/>
 </Control>
 </file>
 
 <file path=customXml/item16.xml><?xml version="1.0" encoding="utf-8"?>
 <Control xmlns="http://schemas.microsoft.com/VisualStudio/2011/storyboarding/control">
-  <Id Name="System.Storyboarding.Common.MousePointer" Revision="1" Stencil="System.Storyboarding.Common" StencilVersion="0.1"/>
+  <Id Name="System.Storyboarding.Common.Button" Revision="1" Stencil="System.Storyboarding.Common" StencilVersion="0.1"/>
 </Control>
 </file>
 
 <file path=customXml/item17.xml><?xml version="1.0" encoding="utf-8"?>
 <Control xmlns="http://schemas.microsoft.com/VisualStudio/2011/storyboarding/control">
-  <Id Name="System.Storyboarding.Backgrounds.WebBrowser" Revision="1" Stencil="System.Storyboarding.Backgrounds" StencilVersion="0.1"/>
+  <Id Name="System.Storyboarding.Common.TextInput" Revision="1" Stencil="System.Storyboarding.Common" StencilVersion="0.1"/>
 </Control>
 </file>
 
 <file path=customXml/item18.xml><?xml version="1.0" encoding="utf-8"?>
 <Control xmlns="http://schemas.microsoft.com/VisualStudio/2011/storyboarding/control">
-  <Id Name="System.Storyboarding.Common.SearchBox" Revision="1" Stencil="System.Storyboarding.Common" StencilVersion="0.1"/>
+  <Id Name="System.Storyboarding.Common.MousePointer" Revision="1" Stencil="System.Storyboarding.Common" StencilVersion="0.1"/>
 </Control>
 </file>
 
@@ -21021,97 +21026,97 @@
 
 <file path=customXml/item20.xml><?xml version="1.0" encoding="utf-8"?>
 <Control xmlns="http://schemas.microsoft.com/VisualStudio/2011/storyboarding/control">
-  <Id Name="System.Storyboarding.Common.TextArea" Revision="1" Stencil="System.Storyboarding.Common" StencilVersion="0.1"/>
+  <Id Name="System.Storyboarding.Common.Button" Revision="1" Stencil="System.Storyboarding.Common" StencilVersion="0.1"/>
 </Control>
 </file>
 
 <file path=customXml/item21.xml><?xml version="1.0" encoding="utf-8"?>
 <Control xmlns="http://schemas.microsoft.com/VisualStudio/2011/storyboarding/control">
-  <Id Name="System.Storyboarding.Common.TextInput" Revision="1" Stencil="System.Storyboarding.Common" StencilVersion="0.1"/>
+  <Id Name="System.Storyboarding.Backgrounds.WebBrowser" Revision="1" Stencil="System.Storyboarding.Backgrounds" StencilVersion="0.1"/>
 </Control>
 </file>
 
 <file path=customXml/item22.xml><?xml version="1.0" encoding="utf-8"?>
 <Control xmlns="http://schemas.microsoft.com/VisualStudio/2011/storyboarding/control">
-  <Id Name="System.Storyboarding.Common.RadioButtonUnselected" Revision="1" Stencil="System.Storyboarding.Common" StencilVersion="0.1"/>
+  <Id Name="System.Storyboarding.Common.TextArea" Revision="1" Stencil="System.Storyboarding.Common" StencilVersion="0.1"/>
 </Control>
 </file>
 
 <file path=customXml/item23.xml><?xml version="1.0" encoding="utf-8"?>
 <Control xmlns="http://schemas.microsoft.com/VisualStudio/2011/storyboarding/control">
-  <Id Name="System.Storyboarding.Common.RadioButtonUnselected" Revision="1" Stencil="System.Storyboarding.Common" StencilVersion="0.1"/>
+  <Id Name="System.Storyboarding.Backgrounds.WebBrowser" Revision="1" Stencil="System.Storyboarding.Backgrounds" StencilVersion="0.1"/>
 </Control>
 </file>
 
 <file path=customXml/item24.xml><?xml version="1.0" encoding="utf-8"?>
 <Control xmlns="http://schemas.microsoft.com/VisualStudio/2011/storyboarding/control">
-  <Id Name="System.Storyboarding.Common.Button" Revision="1" Stencil="System.Storyboarding.Common" StencilVersion="0.1"/>
+  <Id Name="System.Storyboarding.Common.RadioButtonUnselected" Revision="1" Stencil="System.Storyboarding.Common" StencilVersion="0.1"/>
 </Control>
 </file>
 
 <file path=customXml/item25.xml><?xml version="1.0" encoding="utf-8"?>
 <Control xmlns="http://schemas.microsoft.com/VisualStudio/2011/storyboarding/control">
-  <Id Name="System.Storyboarding.Common.Button" Revision="1" Stencil="System.Storyboarding.Common" StencilVersion="0.1"/>
+  <Id Name="System.Storyboarding.Common.TextInput" Revision="1" Stencil="System.Storyboarding.Common" StencilVersion="0.1"/>
 </Control>
 </file>
 
 <file path=customXml/item26.xml><?xml version="1.0" encoding="utf-8"?>
 <Control xmlns="http://schemas.microsoft.com/VisualStudio/2011/storyboarding/control">
-  <Id Name="System.Storyboarding.Common.MousePointer" Revision="1" Stencil="System.Storyboarding.Common" StencilVersion="0.1"/>
+  <Id Name="System.Storyboarding.Common.TextArea" Revision="1" Stencil="System.Storyboarding.Common" StencilVersion="0.1"/>
 </Control>
 </file>
 
 <file path=customXml/item27.xml><?xml version="1.0" encoding="utf-8"?>
 <Control xmlns="http://schemas.microsoft.com/VisualStudio/2011/storyboarding/control">
-  <Id Name="System.Storyboarding.Common.MousePointer" Revision="1" Stencil="System.Storyboarding.Common" StencilVersion="0.1"/>
+  <Id Name="System.Storyboarding.Common.TextArea" Revision="1" Stencil="System.Storyboarding.Common" StencilVersion="0.1"/>
 </Control>
 </file>
 
 <file path=customXml/item28.xml><?xml version="1.0" encoding="utf-8"?>
 <Control xmlns="http://schemas.microsoft.com/VisualStudio/2011/storyboarding/control">
-  <Id Name="System.Storyboarding.Backgrounds.WebBrowser" Revision="1" Stencil="System.Storyboarding.Backgrounds" StencilVersion="0.1"/>
+  <Id Name="System.Storyboarding.Common.RadioButtonUnselected" Revision="1" Stencil="System.Storyboarding.Common" StencilVersion="0.1"/>
 </Control>
 </file>
 
 <file path=customXml/item29.xml><?xml version="1.0" encoding="utf-8"?>
 <Control xmlns="http://schemas.microsoft.com/VisualStudio/2011/storyboarding/control">
-  <Id Name="System.Storyboarding.Common.SearchBox" Revision="1" Stencil="System.Storyboarding.Common" StencilVersion="0.1"/>
+  <Id Name="System.Storyboarding.Common.Text" Revision="1" Stencil="System.Storyboarding.Common" StencilVersion="0.1"/>
 </Control>
 </file>
 
 <file path=customXml/item3.xml><?xml version="1.0" encoding="utf-8"?>
 <Control xmlns="http://schemas.microsoft.com/VisualStudio/2011/storyboarding/control">
-  <Id Name="System.Storyboarding.Common.Button" Revision="1" Stencil="System.Storyboarding.Common" StencilVersion="0.1"/>
+  <Id Name="System.Storyboarding.Common.SearchBox" Revision="1" Stencil="System.Storyboarding.Common" StencilVersion="0.1"/>
 </Control>
 </file>
 
 <file path=customXml/item30.xml><?xml version="1.0" encoding="utf-8"?>
 <Control xmlns="http://schemas.microsoft.com/VisualStudio/2011/storyboarding/control">
-  <Id Name="System.Storyboarding.Common.TextInput" Revision="1" Stencil="System.Storyboarding.Common" StencilVersion="0.1"/>
+  <Id Name="System.Storyboarding.Common.RadioButtonUnselected" Revision="1" Stencil="System.Storyboarding.Common" StencilVersion="0.1"/>
 </Control>
 </file>
 
 <file path=customXml/item31.xml><?xml version="1.0" encoding="utf-8"?>
 <Control xmlns="http://schemas.microsoft.com/VisualStudio/2011/storyboarding/control">
-  <Id Name="System.Storyboarding.Common.TextArea" Revision="1" Stencil="System.Storyboarding.Common" StencilVersion="0.1"/>
+  <Id Name="System.Storyboarding.Common.Button" Revision="1" Stencil="System.Storyboarding.Common" StencilVersion="0.1"/>
 </Control>
 </file>
 
 <file path=customXml/item32.xml><?xml version="1.0" encoding="utf-8"?>
 <Control xmlns="http://schemas.microsoft.com/VisualStudio/2011/storyboarding/control">
-  <Id Name="System.Storyboarding.Common.TextInput" Revision="1" Stencil="System.Storyboarding.Common" StencilVersion="0.1"/>
+  <Id Name="System.Storyboarding.Common.RadioButtonUnselected" Revision="1" Stencil="System.Storyboarding.Common" StencilVersion="0.1"/>
 </Control>
 </file>
 
 <file path=customXml/item33.xml><?xml version="1.0" encoding="utf-8"?>
 <Control xmlns="http://schemas.microsoft.com/VisualStudio/2011/storyboarding/control">
-  <Id Name="System.Storyboarding.Common.RadioButtonUnselected" Revision="1" Stencil="System.Storyboarding.Common" StencilVersion="0.1"/>
+  <Id Name="System.Storyboarding.Common.MousePointer" Revision="1" Stencil="System.Storyboarding.Common" StencilVersion="0.1"/>
 </Control>
 </file>
 
 <file path=customXml/item34.xml><?xml version="1.0" encoding="utf-8"?>
 <Control xmlns="http://schemas.microsoft.com/VisualStudio/2011/storyboarding/control">
-  <Id Name="System.Storyboarding.Common.RadioButtonUnselected" Revision="1" Stencil="System.Storyboarding.Common" StencilVersion="0.1"/>
+  <Id Name="System.Storyboarding.Common.TextInput" Revision="1" Stencil="System.Storyboarding.Common" StencilVersion="0.1"/>
 </Control>
 </file>
 
@@ -21123,7 +21128,7 @@
 
 <file path=customXml/item36.xml><?xml version="1.0" encoding="utf-8"?>
 <Control xmlns="http://schemas.microsoft.com/VisualStudio/2011/storyboarding/control">
-  <Id Name="System.Storyboarding.Common.Button" Revision="1" Stencil="System.Storyboarding.Common" StencilVersion="0.1"/>
+  <Id Name="System.Storyboarding.Common.RadioButtonUnselected" Revision="1" Stencil="System.Storyboarding.Common" StencilVersion="0.1"/>
 </Control>
 </file>
 
@@ -21135,73 +21140,73 @@
 
 <file path=customXml/item38.xml><?xml version="1.0" encoding="utf-8"?>
 <Control xmlns="http://schemas.microsoft.com/VisualStudio/2011/storyboarding/control">
-  <Id Name="System.Storyboarding.Backgrounds.WebBrowser" Revision="1" Stencil="System.Storyboarding.Backgrounds" StencilVersion="0.1"/>
+  <Id Name="System.Storyboarding.Common.SearchBox" Revision="1" Stencil="System.Storyboarding.Common" StencilVersion="0.1"/>
 </Control>
 </file>
 
 <file path=customXml/item39.xml><?xml version="1.0" encoding="utf-8"?>
 <Control xmlns="http://schemas.microsoft.com/VisualStudio/2011/storyboarding/control">
-  <Id Name="System.Storyboarding.Common.SearchBox" Revision="1" Stencil="System.Storyboarding.Common" StencilVersion="0.1"/>
+  <Id Name="System.Storyboarding.Common.MousePointer" Revision="1" Stencil="System.Storyboarding.Common" StencilVersion="0.1"/>
 </Control>
 </file>
 
 <file path=customXml/item4.xml><?xml version="1.0" encoding="utf-8"?>
 <Control xmlns="http://schemas.microsoft.com/VisualStudio/2011/storyboarding/control">
-  <Id Name="System.Storyboarding.Common.Text" Revision="1" Stencil="System.Storyboarding.Common" StencilVersion="0.1"/>
+  <Id Name="System.Storyboarding.Common.TextInput" Revision="1" Stencil="System.Storyboarding.Common" StencilVersion="0.1"/>
 </Control>
 </file>
 
 <file path=customXml/item40.xml><?xml version="1.0" encoding="utf-8"?>
 <Control xmlns="http://schemas.microsoft.com/VisualStudio/2011/storyboarding/control">
-  <Id Name="System.Storyboarding.Common.TextInput" Revision="1" Stencil="System.Storyboarding.Common" StencilVersion="0.1"/>
+  <Id Name="System.Storyboarding.Common.Text" Revision="1" Stencil="System.Storyboarding.Common" StencilVersion="0.1"/>
 </Control>
 </file>
 
 <file path=customXml/item41.xml><?xml version="1.0" encoding="utf-8"?>
 <Control xmlns="http://schemas.microsoft.com/VisualStudio/2011/storyboarding/control">
-  <Id Name="System.Storyboarding.Common.TextArea" Revision="1" Stencil="System.Storyboarding.Common" StencilVersion="0.1"/>
+  <Id Name="System.Storyboarding.Common.TextInput" Revision="1" Stencil="System.Storyboarding.Common" StencilVersion="0.1"/>
 </Control>
 </file>
 
 <file path=customXml/item42.xml><?xml version="1.0" encoding="utf-8"?>
 <Control xmlns="http://schemas.microsoft.com/VisualStudio/2011/storyboarding/control">
-  <Id Name="System.Storyboarding.Common.TextInput" Revision="1" Stencil="System.Storyboarding.Common" StencilVersion="0.1"/>
+  <Id Name="System.Storyboarding.Common.Text" Revision="1" Stencil="System.Storyboarding.Common" StencilVersion="0.1"/>
 </Control>
 </file>
 
 <file path=customXml/item43.xml><?xml version="1.0" encoding="utf-8"?>
 <Control xmlns="http://schemas.microsoft.com/VisualStudio/2011/storyboarding/control">
-  <Id Name="System.Storyboarding.Common.RadioButtonUnselected" Revision="1" Stencil="System.Storyboarding.Common" StencilVersion="0.1"/>
+  <Id Name="System.Storyboarding.Common.Button" Revision="1" Stencil="System.Storyboarding.Common" StencilVersion="0.1"/>
 </Control>
 </file>
 
 <file path=customXml/item44.xml><?xml version="1.0" encoding="utf-8"?>
 <Control xmlns="http://schemas.microsoft.com/VisualStudio/2011/storyboarding/control">
-  <Id Name="System.Storyboarding.Common.RadioButtonUnselected" Revision="1" Stencil="System.Storyboarding.Common" StencilVersion="0.1"/>
+  <Id Name="System.Storyboarding.Common.Button" Revision="1" Stencil="System.Storyboarding.Common" StencilVersion="0.1"/>
 </Control>
 </file>
 
 <file path=customXml/item45.xml><?xml version="1.0" encoding="utf-8"?>
 <Control xmlns="http://schemas.microsoft.com/VisualStudio/2011/storyboarding/control">
-  <Id Name="System.Storyboarding.Common.Button" Revision="1" Stencil="System.Storyboarding.Common" StencilVersion="0.1"/>
+  <Id Name="System.Storyboarding.Common.RadioButtonUnselected" Revision="1" Stencil="System.Storyboarding.Common" StencilVersion="0.1"/>
 </Control>
 </file>
 
 <file path=customXml/item46.xml><?xml version="1.0" encoding="utf-8"?>
 <Control xmlns="http://schemas.microsoft.com/VisualStudio/2011/storyboarding/control">
-  <Id Name="System.Storyboarding.Common.Button" Revision="1" Stencil="System.Storyboarding.Common" StencilVersion="0.1"/>
+  <Id Name="System.Storyboarding.Backgrounds.WebBrowser" Revision="1" Stencil="System.Storyboarding.Backgrounds" StencilVersion="0.1"/>
 </Control>
 </file>
 
 <file path=customXml/item47.xml><?xml version="1.0" encoding="utf-8"?>
 <Control xmlns="http://schemas.microsoft.com/VisualStudio/2011/storyboarding/control">
-  <Id Name="System.Storyboarding.Common.MousePointer" Revision="1" Stencil="System.Storyboarding.Common" StencilVersion="0.1"/>
+  <Id Name="System.Storyboarding.Common.Button" Revision="1" Stencil="System.Storyboarding.Common" StencilVersion="0.1"/>
 </Control>
 </file>
 
 <file path=customXml/item48.xml><?xml version="1.0" encoding="utf-8"?>
 <Control xmlns="http://schemas.microsoft.com/VisualStudio/2011/storyboarding/control">
-  <Id Name="System.Storyboarding.Common.MousePointer" Revision="1" Stencil="System.Storyboarding.Common" StencilVersion="0.1"/>
+  <Id Name="System.Storyboarding.Common.RadioButtonUnselected" Revision="1" Stencil="System.Storyboarding.Common" StencilVersion="0.1"/>
 </Control>
 </file>
 
@@ -21213,31 +21218,31 @@
 
 <file path=customXml/item5.xml><?xml version="1.0" encoding="utf-8"?>
 <Control xmlns="http://schemas.microsoft.com/VisualStudio/2011/storyboarding/control">
-  <Id Name="System.Storyboarding.Backgrounds.WebBrowser" Revision="1" Stencil="System.Storyboarding.Backgrounds" StencilVersion="0.1"/>
+  <Id Name="System.Storyboarding.Common.TextInput" Revision="1" Stencil="System.Storyboarding.Common" StencilVersion="0.1"/>
 </Control>
 </file>
 
 <file path=customXml/item50.xml><?xml version="1.0" encoding="utf-8"?>
 <Control xmlns="http://schemas.microsoft.com/VisualStudio/2011/storyboarding/control">
-  <Id Name="System.Storyboarding.Common.SearchBox" Revision="1" Stencil="System.Storyboarding.Common" StencilVersion="0.1"/>
+  <Id Name="System.Storyboarding.Common.Button" Revision="1" Stencil="System.Storyboarding.Common" StencilVersion="0.1"/>
 </Control>
 </file>
 
 <file path=customXml/item51.xml><?xml version="1.0" encoding="utf-8"?>
 <Control xmlns="http://schemas.microsoft.com/VisualStudio/2011/storyboarding/control">
-  <Id Name="System.Storyboarding.Common.Button" Revision="1" Stencil="System.Storyboarding.Common" StencilVersion="0.1"/>
+  <Id Name="System.Storyboarding.Common.TextInput" Revision="1" Stencil="System.Storyboarding.Common" StencilVersion="0.1"/>
 </Control>
 </file>
 
 <file path=customXml/item52.xml><?xml version="1.0" encoding="utf-8"?>
 <Control xmlns="http://schemas.microsoft.com/VisualStudio/2011/storyboarding/control">
-  <Id Name="System.Storyboarding.Common.Text" Revision="1" Stencil="System.Storyboarding.Common" StencilVersion="0.1"/>
+  <Id Name="System.Storyboarding.Common.TextArea" Revision="1" Stencil="System.Storyboarding.Common" StencilVersion="0.1"/>
 </Control>
 </file>
 
 <file path=customXml/item53.xml><?xml version="1.0" encoding="utf-8"?>
 <Control xmlns="http://schemas.microsoft.com/VisualStudio/2011/storyboarding/control">
-  <Id Name="System.Storyboarding.Backgrounds.WebBrowser" Revision="1" Stencil="System.Storyboarding.Backgrounds" StencilVersion="0.1"/>
+  <Id Name="System.Storyboarding.Common.TextArea" Revision="1" Stencil="System.Storyboarding.Common" StencilVersion="0.1"/>
 </Control>
 </file>
 
@@ -21249,61 +21254,61 @@
 
 <file path=customXml/item55.xml><?xml version="1.0" encoding="utf-8"?>
 <Control xmlns="http://schemas.microsoft.com/VisualStudio/2011/storyboarding/control">
-  <Id Name="System.Storyboarding.Backgrounds.WebBrowser" Revision="1" Stencil="System.Storyboarding.Backgrounds" StencilVersion="0.1"/>
+  <Id Name="System.Storyboarding.Common.Button" Revision="1" Stencil="System.Storyboarding.Common" StencilVersion="0.1"/>
 </Control>
 </file>
 
 <file path=customXml/item56.xml><?xml version="1.0" encoding="utf-8"?>
 <Control xmlns="http://schemas.microsoft.com/VisualStudio/2011/storyboarding/control">
-  <Id Name="System.Storyboarding.Common.SearchBox" Revision="1" Stencil="System.Storyboarding.Common" StencilVersion="0.1"/>
+  <Id Name="System.Storyboarding.Backgrounds.WebBrowser" Revision="1" Stencil="System.Storyboarding.Backgrounds" StencilVersion="0.1"/>
 </Control>
 </file>
 
 <file path=customXml/item57.xml><?xml version="1.0" encoding="utf-8"?>
 <Control xmlns="http://schemas.microsoft.com/VisualStudio/2011/storyboarding/control">
-  <Id Name="System.Storyboarding.Common.TextInput" Revision="1" Stencil="System.Storyboarding.Common" StencilVersion="0.1"/>
+  <Id Name="System.Storyboarding.Common.SearchBox" Revision="1" Stencil="System.Storyboarding.Common" StencilVersion="0.1"/>
 </Control>
 </file>
 
 <file path=customXml/item58.xml><?xml version="1.0" encoding="utf-8"?>
 <Control xmlns="http://schemas.microsoft.com/VisualStudio/2011/storyboarding/control">
-  <Id Name="System.Storyboarding.Common.TextArea" Revision="1" Stencil="System.Storyboarding.Common" StencilVersion="0.1"/>
+  <Id Name="System.Storyboarding.Common.Button" Revision="1" Stencil="System.Storyboarding.Common" StencilVersion="0.1"/>
 </Control>
 </file>
 
 <file path=customXml/item59.xml><?xml version="1.0" encoding="utf-8"?>
 <Control xmlns="http://schemas.microsoft.com/VisualStudio/2011/storyboarding/control">
-  <Id Name="System.Storyboarding.Common.TextInput" Revision="1" Stencil="System.Storyboarding.Common" StencilVersion="0.1"/>
+  <Id Name="System.Storyboarding.Common.RadioButtonUnselected" Revision="1" Stencil="System.Storyboarding.Common" StencilVersion="0.1"/>
 </Control>
 </file>
 
 <file path=customXml/item6.xml><?xml version="1.0" encoding="utf-8"?>
 <Control xmlns="http://schemas.microsoft.com/VisualStudio/2011/storyboarding/control">
-  <Id Name="System.Storyboarding.Common.SearchBox" Revision="1" Stencil="System.Storyboarding.Common" StencilVersion="0.1"/>
+  <Id Name="System.Storyboarding.Common.MousePointer" Revision="1" Stencil="System.Storyboarding.Common" StencilVersion="0.1"/>
 </Control>
 </file>
 
 <file path=customXml/item60.xml><?xml version="1.0" encoding="utf-8"?>
 <Control xmlns="http://schemas.microsoft.com/VisualStudio/2011/storyboarding/control">
-  <Id Name="System.Storyboarding.Common.RadioButtonUnselected" Revision="1" Stencil="System.Storyboarding.Common" StencilVersion="0.1"/>
+  <Id Name="System.Storyboarding.Backgrounds.WebBrowser" Revision="1" Stencil="System.Storyboarding.Backgrounds" StencilVersion="0.1"/>
 </Control>
 </file>
 
 <file path=customXml/item61.xml><?xml version="1.0" encoding="utf-8"?>
 <Control xmlns="http://schemas.microsoft.com/VisualStudio/2011/storyboarding/control">
-  <Id Name="System.Storyboarding.Common.RadioButtonUnselected" Revision="1" Stencil="System.Storyboarding.Common" StencilVersion="0.1"/>
+  <Id Name="System.Storyboarding.Common.Button" Revision="1" Stencil="System.Storyboarding.Common" StencilVersion="0.1"/>
 </Control>
 </file>
 
 <file path=customXml/item62.xml><?xml version="1.0" encoding="utf-8"?>
 <Control xmlns="http://schemas.microsoft.com/VisualStudio/2011/storyboarding/control">
-  <Id Name="System.Storyboarding.Common.Button" Revision="1" Stencil="System.Storyboarding.Common" StencilVersion="0.1"/>
+  <Id Name="System.Storyboarding.Backgrounds.WebBrowser" Revision="1" Stencil="System.Storyboarding.Backgrounds" StencilVersion="0.1"/>
 </Control>
 </file>
 
 <file path=customXml/item63.xml><?xml version="1.0" encoding="utf-8"?>
 <Control xmlns="http://schemas.microsoft.com/VisualStudio/2011/storyboarding/control">
-  <Id Name="System.Storyboarding.Common.Button" Revision="1" Stencil="System.Storyboarding.Common" StencilVersion="0.1"/>
+  <Id Name="System.Storyboarding.Common.TextInput" Revision="1" Stencil="System.Storyboarding.Common" StencilVersion="0.1"/>
 </Control>
 </file>
 
@@ -21321,18 +21326,18 @@
 
 <file path=customXml/item8.xml><?xml version="1.0" encoding="utf-8"?>
 <Control xmlns="http://schemas.microsoft.com/VisualStudio/2011/storyboarding/control">
-  <Id Name="System.Storyboarding.Common.Text" Revision="1" Stencil="System.Storyboarding.Common" StencilVersion="0.1"/>
+  <Id Name="System.Storyboarding.Common.RadioButtonUnselected" Revision="1" Stencil="System.Storyboarding.Common" StencilVersion="0.1"/>
 </Control>
 </file>
 
 <file path=customXml/item9.xml><?xml version="1.0" encoding="utf-8"?>
 <Control xmlns="http://schemas.microsoft.com/VisualStudio/2011/storyboarding/control">
-  <Id Name="System.Storyboarding.Common.TextInput" Revision="1" Stencil="System.Storyboarding.Common" StencilVersion="0.1"/>
+  <Id Name="System.Storyboarding.Common.SearchBox" Revision="1" Stencil="System.Storyboarding.Common" StencilVersion="0.1"/>
 </Control>
 </file>
 
 <file path=customXml/itemProps1.xml><?xml version="1.0" encoding="utf-8"?>
-<ds:datastoreItem xmlns:ds="http://schemas.openxmlformats.org/officeDocument/2006/customXml" ds:itemID="{31441471-E595-4BB5-8B62-FB6EDE34E594}">
+<ds:datastoreItem xmlns:ds="http://schemas.openxmlformats.org/officeDocument/2006/customXml" ds:itemID="{449A1225-4F5D-4254-9ACE-BB09E439D272}">
   <ds:schemaRefs>
     <ds:schemaRef ds:uri="http://schemas.microsoft.com/VisualStudio/2011/storyboarding/control"/>
   </ds:schemaRefs>
@@ -21340,6 +21345,142 @@
 </file>
 
 <file path=customXml/itemProps10.xml><?xml version="1.0" encoding="utf-8"?>
+<ds:datastoreItem xmlns:ds="http://schemas.openxmlformats.org/officeDocument/2006/customXml" ds:itemID="{F87BB709-CD85-445C-8BD8-9AC70B06E5DF}">
+  <ds:schemaRefs>
+    <ds:schemaRef ds:uri="http://schemas.microsoft.com/VisualStudio/2011/storyboarding/control"/>
+  </ds:schemaRefs>
+</ds:datastoreItem>
+</file>
+
+<file path=customXml/itemProps11.xml><?xml version="1.0" encoding="utf-8"?>
+<ds:datastoreItem xmlns:ds="http://schemas.openxmlformats.org/officeDocument/2006/customXml" ds:itemID="{2D86EF9B-4DC9-4A7E-8199-7E5A5709B3F9}">
+  <ds:schemaRefs>
+    <ds:schemaRef ds:uri="http://schemas.microsoft.com/VisualStudio/2011/storyboarding/control"/>
+  </ds:schemaRefs>
+</ds:datastoreItem>
+</file>
+
+<file path=customXml/itemProps12.xml><?xml version="1.0" encoding="utf-8"?>
+<ds:datastoreItem xmlns:ds="http://schemas.openxmlformats.org/officeDocument/2006/customXml" ds:itemID="{E8F3563D-621C-4F4A-B033-FE569883ED2D}">
+  <ds:schemaRefs>
+    <ds:schemaRef ds:uri="http://schemas.microsoft.com/VisualStudio/2011/storyboarding/control"/>
+  </ds:schemaRefs>
+</ds:datastoreItem>
+</file>
+
+<file path=customXml/itemProps13.xml><?xml version="1.0" encoding="utf-8"?>
+<ds:datastoreItem xmlns:ds="http://schemas.openxmlformats.org/officeDocument/2006/customXml" ds:itemID="{974B42F1-1AD9-4395-8956-B6AEE5BE9D6B}">
+  <ds:schemaRefs>
+    <ds:schemaRef ds:uri="http://schemas.microsoft.com/VisualStudio/2011/storyboarding/control"/>
+  </ds:schemaRefs>
+</ds:datastoreItem>
+</file>
+
+<file path=customXml/itemProps14.xml><?xml version="1.0" encoding="utf-8"?>
+<ds:datastoreItem xmlns:ds="http://schemas.openxmlformats.org/officeDocument/2006/customXml" ds:itemID="{1F879745-1105-44A9-8419-8E7DCB760D73}">
+  <ds:schemaRefs>
+    <ds:schemaRef ds:uri="http://schemas.microsoft.com/VisualStudio/2011/storyboarding/control"/>
+  </ds:schemaRefs>
+</ds:datastoreItem>
+</file>
+
+<file path=customXml/itemProps15.xml><?xml version="1.0" encoding="utf-8"?>
+<ds:datastoreItem xmlns:ds="http://schemas.openxmlformats.org/officeDocument/2006/customXml" ds:itemID="{380496B2-CD29-439E-BFC1-17B6F6D74631}">
+  <ds:schemaRefs>
+    <ds:schemaRef ds:uri="http://schemas.microsoft.com/VisualStudio/2011/storyboarding/control"/>
+  </ds:schemaRefs>
+</ds:datastoreItem>
+</file>
+
+<file path=customXml/itemProps16.xml><?xml version="1.0" encoding="utf-8"?>
+<ds:datastoreItem xmlns:ds="http://schemas.openxmlformats.org/officeDocument/2006/customXml" ds:itemID="{97F44E3E-4184-4E8F-AD0F-5DF3FCCC907B}">
+  <ds:schemaRefs>
+    <ds:schemaRef ds:uri="http://schemas.microsoft.com/VisualStudio/2011/storyboarding/control"/>
+  </ds:schemaRefs>
+</ds:datastoreItem>
+</file>
+
+<file path=customXml/itemProps17.xml><?xml version="1.0" encoding="utf-8"?>
+<ds:datastoreItem xmlns:ds="http://schemas.openxmlformats.org/officeDocument/2006/customXml" ds:itemID="{E4174252-B81A-461C-94FD-9BCC9DDDCB62}">
+  <ds:schemaRefs>
+    <ds:schemaRef ds:uri="http://schemas.microsoft.com/VisualStudio/2011/storyboarding/control"/>
+  </ds:schemaRefs>
+</ds:datastoreItem>
+</file>
+
+<file path=customXml/itemProps18.xml><?xml version="1.0" encoding="utf-8"?>
+<ds:datastoreItem xmlns:ds="http://schemas.openxmlformats.org/officeDocument/2006/customXml" ds:itemID="{01FFEF94-D0BB-431A-9A11-7A6B2D2FD8B8}">
+  <ds:schemaRefs>
+    <ds:schemaRef ds:uri="http://schemas.microsoft.com/VisualStudio/2011/storyboarding/control"/>
+  </ds:schemaRefs>
+</ds:datastoreItem>
+</file>
+
+<file path=customXml/itemProps19.xml><?xml version="1.0" encoding="utf-8"?>
+<ds:datastoreItem xmlns:ds="http://schemas.openxmlformats.org/officeDocument/2006/customXml" ds:itemID="{A15C0578-2B4E-432E-968C-667FA95B2489}">
+  <ds:schemaRefs>
+    <ds:schemaRef ds:uri="http://schemas.microsoft.com/VisualStudio/2011/storyboarding/control"/>
+  </ds:schemaRefs>
+</ds:datastoreItem>
+</file>
+
+<file path=customXml/itemProps2.xml><?xml version="1.0" encoding="utf-8"?>
+<ds:datastoreItem xmlns:ds="http://schemas.openxmlformats.org/officeDocument/2006/customXml" ds:itemID="{A9B96C98-3516-4A05-A802-AD425298D8EE}">
+  <ds:schemaRefs>
+    <ds:schemaRef ds:uri="http://schemas.microsoft.com/VisualStudio/2011/storyboarding/control"/>
+  </ds:schemaRefs>
+</ds:datastoreItem>
+</file>
+
+<file path=customXml/itemProps20.xml><?xml version="1.0" encoding="utf-8"?>
+<ds:datastoreItem xmlns:ds="http://schemas.openxmlformats.org/officeDocument/2006/customXml" ds:itemID="{197E03B2-12EA-4AE5-A658-AEFB4A4969F0}">
+  <ds:schemaRefs>
+    <ds:schemaRef ds:uri="http://schemas.microsoft.com/VisualStudio/2011/storyboarding/control"/>
+  </ds:schemaRefs>
+</ds:datastoreItem>
+</file>
+
+<file path=customXml/itemProps21.xml><?xml version="1.0" encoding="utf-8"?>
+<ds:datastoreItem xmlns:ds="http://schemas.openxmlformats.org/officeDocument/2006/customXml" ds:itemID="{32C4BD6A-8F35-45B9-AA1C-2E01578AB6B6}">
+  <ds:schemaRefs>
+    <ds:schemaRef ds:uri="http://schemas.microsoft.com/VisualStudio/2011/storyboarding/control"/>
+  </ds:schemaRefs>
+</ds:datastoreItem>
+</file>
+
+<file path=customXml/itemProps22.xml><?xml version="1.0" encoding="utf-8"?>
+<ds:datastoreItem xmlns:ds="http://schemas.openxmlformats.org/officeDocument/2006/customXml" ds:itemID="{F0C6452F-C1D8-4C0A-9BB1-E8C6CED0E975}">
+  <ds:schemaRefs>
+    <ds:schemaRef ds:uri="http://schemas.microsoft.com/VisualStudio/2011/storyboarding/control"/>
+  </ds:schemaRefs>
+</ds:datastoreItem>
+</file>
+
+<file path=customXml/itemProps23.xml><?xml version="1.0" encoding="utf-8"?>
+<ds:datastoreItem xmlns:ds="http://schemas.openxmlformats.org/officeDocument/2006/customXml" ds:itemID="{487FC4D0-890B-4EEE-BCEF-57C18A3D7FC7}">
+  <ds:schemaRefs>
+    <ds:schemaRef ds:uri="http://schemas.microsoft.com/VisualStudio/2011/storyboarding/control"/>
+  </ds:schemaRefs>
+</ds:datastoreItem>
+</file>
+
+<file path=customXml/itemProps24.xml><?xml version="1.0" encoding="utf-8"?>
+<ds:datastoreItem xmlns:ds="http://schemas.openxmlformats.org/officeDocument/2006/customXml" ds:itemID="{840C981A-06A9-4180-8908-1CD3C44EBB7B}">
+  <ds:schemaRefs>
+    <ds:schemaRef ds:uri="http://schemas.microsoft.com/VisualStudio/2011/storyboarding/control"/>
+  </ds:schemaRefs>
+</ds:datastoreItem>
+</file>
+
+<file path=customXml/itemProps25.xml><?xml version="1.0" encoding="utf-8"?>
+<ds:datastoreItem xmlns:ds="http://schemas.openxmlformats.org/officeDocument/2006/customXml" ds:itemID="{C9672E6F-B085-4662-AD94-6933DCA8462F}">
+  <ds:schemaRefs>
+    <ds:schemaRef ds:uri="http://schemas.microsoft.com/VisualStudio/2011/storyboarding/control"/>
+  </ds:schemaRefs>
+</ds:datastoreItem>
+</file>
+
+<file path=customXml/itemProps26.xml><?xml version="1.0" encoding="utf-8"?>
 <ds:datastoreItem xmlns:ds="http://schemas.openxmlformats.org/officeDocument/2006/customXml" ds:itemID="{CEF86DB2-3911-4AA1-8775-C8791F39CEEC}">
   <ds:schemaRefs>
     <ds:schemaRef ds:uri="http://schemas.microsoft.com/VisualStudio/2011/storyboarding/control"/>
@@ -21347,31 +21488,47 @@
 </ds:datastoreItem>
 </file>
 
-<file path=customXml/itemProps11.xml><?xml version="1.0" encoding="utf-8"?>
-<ds:datastoreItem xmlns:ds="http://schemas.openxmlformats.org/officeDocument/2006/customXml" ds:itemID="{380496B2-CD29-439E-BFC1-17B6F6D74631}">
+<file path=customXml/itemProps27.xml><?xml version="1.0" encoding="utf-8"?>
+<ds:datastoreItem xmlns:ds="http://schemas.openxmlformats.org/officeDocument/2006/customXml" ds:itemID="{D46D5843-E37D-46B1-B39F-5A44269AD6D0}">
   <ds:schemaRefs>
     <ds:schemaRef ds:uri="http://schemas.microsoft.com/VisualStudio/2011/storyboarding/control"/>
   </ds:schemaRefs>
 </ds:datastoreItem>
 </file>
 
-<file path=customXml/itemProps12.xml><?xml version="1.0" encoding="utf-8"?>
-<ds:datastoreItem xmlns:ds="http://schemas.openxmlformats.org/officeDocument/2006/customXml" ds:itemID="{67A5E7BE-8375-4425-9594-C01E15EF2651}">
+<file path=customXml/itemProps28.xml><?xml version="1.0" encoding="utf-8"?>
+<ds:datastoreItem xmlns:ds="http://schemas.openxmlformats.org/officeDocument/2006/customXml" ds:itemID="{87E3A964-C784-4831-838C-1341082CA0D0}">
   <ds:schemaRefs>
     <ds:schemaRef ds:uri="http://schemas.microsoft.com/VisualStudio/2011/storyboarding/control"/>
   </ds:schemaRefs>
 </ds:datastoreItem>
 </file>
 
-<file path=customXml/itemProps13.xml><?xml version="1.0" encoding="utf-8"?>
-<ds:datastoreItem xmlns:ds="http://schemas.openxmlformats.org/officeDocument/2006/customXml" ds:itemID="{449A1225-4F5D-4254-9ACE-BB09E439D272}">
+<file path=customXml/itemProps29.xml><?xml version="1.0" encoding="utf-8"?>
+<ds:datastoreItem xmlns:ds="http://schemas.openxmlformats.org/officeDocument/2006/customXml" ds:itemID="{B5C69DAF-B3EA-41DA-A86F-668A71D2FD96}">
   <ds:schemaRefs>
     <ds:schemaRef ds:uri="http://schemas.microsoft.com/VisualStudio/2011/storyboarding/control"/>
   </ds:schemaRefs>
 </ds:datastoreItem>
 </file>
 
-<file path=customXml/itemProps14.xml><?xml version="1.0" encoding="utf-8"?>
+<file path=customXml/itemProps3.xml><?xml version="1.0" encoding="utf-8"?>
+<ds:datastoreItem xmlns:ds="http://schemas.openxmlformats.org/officeDocument/2006/customXml" ds:itemID="{0367E21E-BD8D-4BD9-9863-EB18008DA01F}">
+  <ds:schemaRefs>
+    <ds:schemaRef ds:uri="http://schemas.microsoft.com/VisualStudio/2011/storyboarding/control"/>
+  </ds:schemaRefs>
+</ds:datastoreItem>
+</file>
+
+<file path=customXml/itemProps30.xml><?xml version="1.0" encoding="utf-8"?>
+<ds:datastoreItem xmlns:ds="http://schemas.openxmlformats.org/officeDocument/2006/customXml" ds:itemID="{B1F3A6E5-9671-4EF1-8CCC-623FA6A2DE7F}">
+  <ds:schemaRefs>
+    <ds:schemaRef ds:uri="http://schemas.microsoft.com/VisualStudio/2011/storyboarding/control"/>
+  </ds:schemaRefs>
+</ds:datastoreItem>
+</file>
+
+<file path=customXml/itemProps31.xml><?xml version="1.0" encoding="utf-8"?>
 <ds:datastoreItem xmlns:ds="http://schemas.openxmlformats.org/officeDocument/2006/customXml" ds:itemID="{18479CBD-00A4-4343-8A6F-D192772CDD2F}">
   <ds:schemaRefs>
     <ds:schemaRef ds:uri="http://schemas.microsoft.com/VisualStudio/2011/storyboarding/control"/>
@@ -21379,71 +21536,7 @@
 </ds:datastoreItem>
 </file>
 
-<file path=customXml/itemProps15.xml><?xml version="1.0" encoding="utf-8"?>
-<ds:datastoreItem xmlns:ds="http://schemas.openxmlformats.org/officeDocument/2006/customXml" ds:itemID="{CB8E043B-45F5-4D5B-AA27-B56B500D4A1E}">
-  <ds:schemaRefs>
-    <ds:schemaRef ds:uri="http://schemas.microsoft.com/VisualStudio/2011/storyboarding/control"/>
-  </ds:schemaRefs>
-</ds:datastoreItem>
-</file>
-
-<file path=customXml/itemProps16.xml><?xml version="1.0" encoding="utf-8"?>
-<ds:datastoreItem xmlns:ds="http://schemas.openxmlformats.org/officeDocument/2006/customXml" ds:itemID="{E8F3563D-621C-4F4A-B033-FE569883ED2D}">
-  <ds:schemaRefs>
-    <ds:schemaRef ds:uri="http://schemas.microsoft.com/VisualStudio/2011/storyboarding/control"/>
-  </ds:schemaRefs>
-</ds:datastoreItem>
-</file>
-
-<file path=customXml/itemProps17.xml><?xml version="1.0" encoding="utf-8"?>
-<ds:datastoreItem xmlns:ds="http://schemas.openxmlformats.org/officeDocument/2006/customXml" ds:itemID="{E5444432-A8F9-4D81-8015-BFFC7D016B03}">
-  <ds:schemaRefs>
-    <ds:schemaRef ds:uri="http://schemas.microsoft.com/VisualStudio/2011/storyboarding/control"/>
-  </ds:schemaRefs>
-</ds:datastoreItem>
-</file>
-
-<file path=customXml/itemProps18.xml><?xml version="1.0" encoding="utf-8"?>
-<ds:datastoreItem xmlns:ds="http://schemas.openxmlformats.org/officeDocument/2006/customXml" ds:itemID="{A9B96C98-3516-4A05-A802-AD425298D8EE}">
-  <ds:schemaRefs>
-    <ds:schemaRef ds:uri="http://schemas.microsoft.com/VisualStudio/2011/storyboarding/control"/>
-  </ds:schemaRefs>
-</ds:datastoreItem>
-</file>
-
-<file path=customXml/itemProps19.xml><?xml version="1.0" encoding="utf-8"?>
-<ds:datastoreItem xmlns:ds="http://schemas.openxmlformats.org/officeDocument/2006/customXml" ds:itemID="{C9672E6F-B085-4662-AD94-6933DCA8462F}">
-  <ds:schemaRefs>
-    <ds:schemaRef ds:uri="http://schemas.microsoft.com/VisualStudio/2011/storyboarding/control"/>
-  </ds:schemaRefs>
-</ds:datastoreItem>
-</file>
-
-<file path=customXml/itemProps2.xml><?xml version="1.0" encoding="utf-8"?>
-<ds:datastoreItem xmlns:ds="http://schemas.openxmlformats.org/officeDocument/2006/customXml" ds:itemID="{974B42F1-1AD9-4395-8956-B6AEE5BE9D6B}">
-  <ds:schemaRefs>
-    <ds:schemaRef ds:uri="http://schemas.microsoft.com/VisualStudio/2011/storyboarding/control"/>
-  </ds:schemaRefs>
-</ds:datastoreItem>
-</file>
-
-<file path=customXml/itemProps20.xml><?xml version="1.0" encoding="utf-8"?>
-<ds:datastoreItem xmlns:ds="http://schemas.openxmlformats.org/officeDocument/2006/customXml" ds:itemID="{66BCCA39-F658-4DC1-B56C-FDD66FE60FA7}">
-  <ds:schemaRefs>
-    <ds:schemaRef ds:uri="http://schemas.microsoft.com/VisualStudio/2011/storyboarding/control"/>
-  </ds:schemaRefs>
-</ds:datastoreItem>
-</file>
-
-<file path=customXml/itemProps21.xml><?xml version="1.0" encoding="utf-8"?>
-<ds:datastoreItem xmlns:ds="http://schemas.openxmlformats.org/officeDocument/2006/customXml" ds:itemID="{19C5A68D-E153-432A-994A-B68D7E7D425B}">
-  <ds:schemaRefs>
-    <ds:schemaRef ds:uri="http://schemas.microsoft.com/VisualStudio/2011/storyboarding/control"/>
-  </ds:schemaRefs>
-</ds:datastoreItem>
-</file>
-
-<file path=customXml/itemProps22.xml><?xml version="1.0" encoding="utf-8"?>
+<file path=customXml/itemProps32.xml><?xml version="1.0" encoding="utf-8"?>
 <ds:datastoreItem xmlns:ds="http://schemas.openxmlformats.org/officeDocument/2006/customXml" ds:itemID="{5CCAF1B1-9F08-433A-BE37-9170B3509B6D}">
   <ds:schemaRefs>
     <ds:schemaRef ds:uri="http://schemas.microsoft.com/VisualStudio/2011/storyboarding/control"/>
@@ -21451,39 +21544,7 @@
 </ds:datastoreItem>
 </file>
 
-<file path=customXml/itemProps23.xml><?xml version="1.0" encoding="utf-8"?>
-<ds:datastoreItem xmlns:ds="http://schemas.openxmlformats.org/officeDocument/2006/customXml" ds:itemID="{C648EE62-EAE8-4EA3-AF14-75FD647863E3}">
-  <ds:schemaRefs>
-    <ds:schemaRef ds:uri="http://schemas.microsoft.com/VisualStudio/2011/storyboarding/control"/>
-  </ds:schemaRefs>
-</ds:datastoreItem>
-</file>
-
-<file path=customXml/itemProps24.xml><?xml version="1.0" encoding="utf-8"?>
-<ds:datastoreItem xmlns:ds="http://schemas.openxmlformats.org/officeDocument/2006/customXml" ds:itemID="{97F44E3E-4184-4E8F-AD0F-5DF3FCCC907B}">
-  <ds:schemaRefs>
-    <ds:schemaRef ds:uri="http://schemas.microsoft.com/VisualStudio/2011/storyboarding/control"/>
-  </ds:schemaRefs>
-</ds:datastoreItem>
-</file>
-
-<file path=customXml/itemProps25.xml><?xml version="1.0" encoding="utf-8"?>
-<ds:datastoreItem xmlns:ds="http://schemas.openxmlformats.org/officeDocument/2006/customXml" ds:itemID="{D6544C51-2909-485C-8246-FF3E420B7E79}">
-  <ds:schemaRefs>
-    <ds:schemaRef ds:uri="http://schemas.microsoft.com/VisualStudio/2011/storyboarding/control"/>
-  </ds:schemaRefs>
-</ds:datastoreItem>
-</file>
-
-<file path=customXml/itemProps26.xml><?xml version="1.0" encoding="utf-8"?>
-<ds:datastoreItem xmlns:ds="http://schemas.openxmlformats.org/officeDocument/2006/customXml" ds:itemID="{68E9C494-82F9-44D0-ABAB-FDCCB51BB4E7}">
-  <ds:schemaRefs>
-    <ds:schemaRef ds:uri="http://schemas.microsoft.com/VisualStudio/2011/storyboarding/control"/>
-  </ds:schemaRefs>
-</ds:datastoreItem>
-</file>
-
-<file path=customXml/itemProps27.xml><?xml version="1.0" encoding="utf-8"?>
+<file path=customXml/itemProps33.xml><?xml version="1.0" encoding="utf-8"?>
 <ds:datastoreItem xmlns:ds="http://schemas.openxmlformats.org/officeDocument/2006/customXml" ds:itemID="{14F7EE16-EE99-4B97-9311-828C732BE14D}">
   <ds:schemaRefs>
     <ds:schemaRef ds:uri="http://schemas.microsoft.com/VisualStudio/2011/storyboarding/control"/>
@@ -21491,64 +21552,8 @@
 </ds:datastoreItem>
 </file>
 
-<file path=customXml/itemProps28.xml><?xml version="1.0" encoding="utf-8"?>
-<ds:datastoreItem xmlns:ds="http://schemas.openxmlformats.org/officeDocument/2006/customXml" ds:itemID="{D762AECD-FD4E-459E-9A0C-CD997B6F6CCB}">
-  <ds:schemaRefs>
-    <ds:schemaRef ds:uri="http://schemas.microsoft.com/VisualStudio/2011/storyboarding/control"/>
-  </ds:schemaRefs>
-</ds:datastoreItem>
-</file>
-
-<file path=customXml/itemProps29.xml><?xml version="1.0" encoding="utf-8"?>
-<ds:datastoreItem xmlns:ds="http://schemas.openxmlformats.org/officeDocument/2006/customXml" ds:itemID="{1F879745-1105-44A9-8419-8E7DCB760D73}">
-  <ds:schemaRefs>
-    <ds:schemaRef ds:uri="http://schemas.microsoft.com/VisualStudio/2011/storyboarding/control"/>
-  </ds:schemaRefs>
-</ds:datastoreItem>
-</file>
-
-<file path=customXml/itemProps3.xml><?xml version="1.0" encoding="utf-8"?>
-<ds:datastoreItem xmlns:ds="http://schemas.openxmlformats.org/officeDocument/2006/customXml" ds:itemID="{3F12AB67-2E12-44D8-BE00-E19DAC77413B}">
-  <ds:schemaRefs>
-    <ds:schemaRef ds:uri="http://schemas.microsoft.com/VisualStudio/2011/storyboarding/control"/>
-  </ds:schemaRefs>
-</ds:datastoreItem>
-</file>
-
-<file path=customXml/itemProps30.xml><?xml version="1.0" encoding="utf-8"?>
+<file path=customXml/itemProps34.xml><?xml version="1.0" encoding="utf-8"?>
 <ds:datastoreItem xmlns:ds="http://schemas.openxmlformats.org/officeDocument/2006/customXml" ds:itemID="{A0540D58-4C76-48BD-BAA0-A803CA462E79}">
-  <ds:schemaRefs>
-    <ds:schemaRef ds:uri="http://schemas.microsoft.com/VisualStudio/2011/storyboarding/control"/>
-  </ds:schemaRefs>
-</ds:datastoreItem>
-</file>
-
-<file path=customXml/itemProps31.xml><?xml version="1.0" encoding="utf-8"?>
-<ds:datastoreItem xmlns:ds="http://schemas.openxmlformats.org/officeDocument/2006/customXml" ds:itemID="{D46D5843-E37D-46B1-B39F-5A44269AD6D0}">
-  <ds:schemaRefs>
-    <ds:schemaRef ds:uri="http://schemas.microsoft.com/VisualStudio/2011/storyboarding/control"/>
-  </ds:schemaRefs>
-</ds:datastoreItem>
-</file>
-
-<file path=customXml/itemProps32.xml><?xml version="1.0" encoding="utf-8"?>
-<ds:datastoreItem xmlns:ds="http://schemas.openxmlformats.org/officeDocument/2006/customXml" ds:itemID="{E4174252-B81A-461C-94FD-9BCC9DDDCB62}">
-  <ds:schemaRefs>
-    <ds:schemaRef ds:uri="http://schemas.microsoft.com/VisualStudio/2011/storyboarding/control"/>
-  </ds:schemaRefs>
-</ds:datastoreItem>
-</file>
-
-<file path=customXml/itemProps33.xml><?xml version="1.0" encoding="utf-8"?>
-<ds:datastoreItem xmlns:ds="http://schemas.openxmlformats.org/officeDocument/2006/customXml" ds:itemID="{669BBA10-FF27-4E50-9259-62C6B8794DEE}">
-  <ds:schemaRefs>
-    <ds:schemaRef ds:uri="http://schemas.microsoft.com/VisualStudio/2011/storyboarding/control"/>
-  </ds:schemaRefs>
-</ds:datastoreItem>
-</file>
-
-<file path=customXml/itemProps34.xml><?xml version="1.0" encoding="utf-8"?>
-<ds:datastoreItem xmlns:ds="http://schemas.openxmlformats.org/officeDocument/2006/customXml" ds:itemID="{40324C11-64C9-495C-B044-F613A3EF9F29}">
   <ds:schemaRefs>
     <ds:schemaRef ds:uri="http://schemas.microsoft.com/VisualStudio/2011/storyboarding/control"/>
   </ds:schemaRefs>
@@ -21564,7 +21569,7 @@
 </file>
 
 <file path=customXml/itemProps36.xml><?xml version="1.0" encoding="utf-8"?>
-<ds:datastoreItem xmlns:ds="http://schemas.openxmlformats.org/officeDocument/2006/customXml" ds:itemID="{A2B888DF-84F5-42B1-B224-CCFB037705D5}">
+<ds:datastoreItem xmlns:ds="http://schemas.openxmlformats.org/officeDocument/2006/customXml" ds:itemID="{228CCE8E-5AB4-4176-A946-269F97A1938B}">
   <ds:schemaRefs>
     <ds:schemaRef ds:uri="http://schemas.microsoft.com/VisualStudio/2011/storyboarding/control"/>
   </ds:schemaRefs>
@@ -21572,7 +21577,7 @@
 </file>
 
 <file path=customXml/itemProps37.xml><?xml version="1.0" encoding="utf-8"?>
-<ds:datastoreItem xmlns:ds="http://schemas.openxmlformats.org/officeDocument/2006/customXml" ds:itemID="{01FFEF94-D0BB-431A-9A11-7A6B2D2FD8B8}">
+<ds:datastoreItem xmlns:ds="http://schemas.openxmlformats.org/officeDocument/2006/customXml" ds:itemID="{6087D994-5CAD-448E-A469-B702B1A8D395}">
   <ds:schemaRefs>
     <ds:schemaRef ds:uri="http://schemas.microsoft.com/VisualStudio/2011/storyboarding/control"/>
   </ds:schemaRefs>
@@ -21580,6 +21585,102 @@
 </file>
 
 <file path=customXml/itemProps38.xml><?xml version="1.0" encoding="utf-8"?>
+<ds:datastoreItem xmlns:ds="http://schemas.openxmlformats.org/officeDocument/2006/customXml" ds:itemID="{BE99DE31-AD0F-4003-9AC3-D632ED770545}">
+  <ds:schemaRefs>
+    <ds:schemaRef ds:uri="http://schemas.microsoft.com/VisualStudio/2011/storyboarding/control"/>
+  </ds:schemaRefs>
+</ds:datastoreItem>
+</file>
+
+<file path=customXml/itemProps39.xml><?xml version="1.0" encoding="utf-8"?>
+<ds:datastoreItem xmlns:ds="http://schemas.openxmlformats.org/officeDocument/2006/customXml" ds:itemID="{0C895A0F-3651-43E7-96FD-1DEB79535254}">
+  <ds:schemaRefs>
+    <ds:schemaRef ds:uri="http://schemas.microsoft.com/VisualStudio/2011/storyboarding/control"/>
+  </ds:schemaRefs>
+</ds:datastoreItem>
+</file>
+
+<file path=customXml/itemProps4.xml><?xml version="1.0" encoding="utf-8"?>
+<ds:datastoreItem xmlns:ds="http://schemas.openxmlformats.org/officeDocument/2006/customXml" ds:itemID="{19C5A68D-E153-432A-994A-B68D7E7D425B}">
+  <ds:schemaRefs>
+    <ds:schemaRef ds:uri="http://schemas.microsoft.com/VisualStudio/2011/storyboarding/control"/>
+  </ds:schemaRefs>
+</ds:datastoreItem>
+</file>
+
+<file path=customXml/itemProps40.xml><?xml version="1.0" encoding="utf-8"?>
+<ds:datastoreItem xmlns:ds="http://schemas.openxmlformats.org/officeDocument/2006/customXml" ds:itemID="{4053B059-6D3E-4C23-8C7B-1616C814AC61}">
+  <ds:schemaRefs>
+    <ds:schemaRef ds:uri="http://schemas.microsoft.com/VisualStudio/2011/storyboarding/control"/>
+  </ds:schemaRefs>
+</ds:datastoreItem>
+</file>
+
+<file path=customXml/itemProps41.xml><?xml version="1.0" encoding="utf-8"?>
+<ds:datastoreItem xmlns:ds="http://schemas.openxmlformats.org/officeDocument/2006/customXml" ds:itemID="{956B4365-E045-42E9-A789-1D28723D04C7}">
+  <ds:schemaRefs>
+    <ds:schemaRef ds:uri="http://schemas.microsoft.com/VisualStudio/2011/storyboarding/control"/>
+  </ds:schemaRefs>
+</ds:datastoreItem>
+</file>
+
+<file path=customXml/itemProps42.xml><?xml version="1.0" encoding="utf-8"?>
+<ds:datastoreItem xmlns:ds="http://schemas.openxmlformats.org/officeDocument/2006/customXml" ds:itemID="{0A25B352-A0FD-4760-8CF9-51B50D49D5E9}">
+  <ds:schemaRefs>
+    <ds:schemaRef ds:uri="http://schemas.microsoft.com/VisualStudio/2011/storyboarding/control"/>
+  </ds:schemaRefs>
+</ds:datastoreItem>
+</file>
+
+<file path=customXml/itemProps43.xml><?xml version="1.0" encoding="utf-8"?>
+<ds:datastoreItem xmlns:ds="http://schemas.openxmlformats.org/officeDocument/2006/customXml" ds:itemID="{F08FF0C8-45C8-4CCA-829E-B7E5EE935DC6}">
+  <ds:schemaRefs>
+    <ds:schemaRef ds:uri="http://schemas.microsoft.com/VisualStudio/2011/storyboarding/control"/>
+  </ds:schemaRefs>
+</ds:datastoreItem>
+</file>
+
+<file path=customXml/itemProps44.xml><?xml version="1.0" encoding="utf-8"?>
+<ds:datastoreItem xmlns:ds="http://schemas.openxmlformats.org/officeDocument/2006/customXml" ds:itemID="{3F12AB67-2E12-44D8-BE00-E19DAC77413B}">
+  <ds:schemaRefs>
+    <ds:schemaRef ds:uri="http://schemas.microsoft.com/VisualStudio/2011/storyboarding/control"/>
+  </ds:schemaRefs>
+</ds:datastoreItem>
+</file>
+
+<file path=customXml/itemProps45.xml><?xml version="1.0" encoding="utf-8"?>
+<ds:datastoreItem xmlns:ds="http://schemas.openxmlformats.org/officeDocument/2006/customXml" ds:itemID="{67A5E7BE-8375-4425-9594-C01E15EF2651}">
+  <ds:schemaRefs>
+    <ds:schemaRef ds:uri="http://schemas.microsoft.com/VisualStudio/2011/storyboarding/control"/>
+  </ds:schemaRefs>
+</ds:datastoreItem>
+</file>
+
+<file path=customXml/itemProps46.xml><?xml version="1.0" encoding="utf-8"?>
+<ds:datastoreItem xmlns:ds="http://schemas.openxmlformats.org/officeDocument/2006/customXml" ds:itemID="{E5444432-A8F9-4D81-8015-BFFC7D016B03}">
+  <ds:schemaRefs>
+    <ds:schemaRef ds:uri="http://schemas.microsoft.com/VisualStudio/2011/storyboarding/control"/>
+  </ds:schemaRefs>
+</ds:datastoreItem>
+</file>
+
+<file path=customXml/itemProps47.xml><?xml version="1.0" encoding="utf-8"?>
+<ds:datastoreItem xmlns:ds="http://schemas.openxmlformats.org/officeDocument/2006/customXml" ds:itemID="{D6544C51-2909-485C-8246-FF3E420B7E79}">
+  <ds:schemaRefs>
+    <ds:schemaRef ds:uri="http://schemas.microsoft.com/VisualStudio/2011/storyboarding/control"/>
+  </ds:schemaRefs>
+</ds:datastoreItem>
+</file>
+
+<file path=customXml/itemProps48.xml><?xml version="1.0" encoding="utf-8"?>
+<ds:datastoreItem xmlns:ds="http://schemas.openxmlformats.org/officeDocument/2006/customXml" ds:itemID="{669BBA10-FF27-4E50-9259-62C6B8794DEE}">
+  <ds:schemaRefs>
+    <ds:schemaRef ds:uri="http://schemas.microsoft.com/VisualStudio/2011/storyboarding/control"/>
+  </ds:schemaRefs>
+</ds:datastoreItem>
+</file>
+
+<file path=customXml/itemProps49.xml><?xml version="1.0" encoding="utf-8"?>
 <ds:datastoreItem xmlns:ds="http://schemas.openxmlformats.org/officeDocument/2006/customXml" ds:itemID="{56A6CA28-ABFA-4BEF-8327-8E0DF2641280}">
   <ds:schemaRefs>
     <ds:schemaRef ds:uri="http://schemas.microsoft.com/VisualStudio/2011/storyboarding/control"/>
@@ -21587,39 +21688,7 @@
 </ds:datastoreItem>
 </file>
 
-<file path=customXml/itemProps39.xml><?xml version="1.0" encoding="utf-8"?>
-<ds:datastoreItem xmlns:ds="http://schemas.openxmlformats.org/officeDocument/2006/customXml" ds:itemID="{0367E21E-BD8D-4BD9-9863-EB18008DA01F}">
-  <ds:schemaRefs>
-    <ds:schemaRef ds:uri="http://schemas.microsoft.com/VisualStudio/2011/storyboarding/control"/>
-  </ds:schemaRefs>
-</ds:datastoreItem>
-</file>
-
-<file path=customXml/itemProps4.xml><?xml version="1.0" encoding="utf-8"?>
-<ds:datastoreItem xmlns:ds="http://schemas.openxmlformats.org/officeDocument/2006/customXml" ds:itemID="{4053B059-6D3E-4C23-8C7B-1616C814AC61}">
-  <ds:schemaRefs>
-    <ds:schemaRef ds:uri="http://schemas.microsoft.com/VisualStudio/2011/storyboarding/control"/>
-  </ds:schemaRefs>
-</ds:datastoreItem>
-</file>
-
-<file path=customXml/itemProps40.xml><?xml version="1.0" encoding="utf-8"?>
-<ds:datastoreItem xmlns:ds="http://schemas.openxmlformats.org/officeDocument/2006/customXml" ds:itemID="{A15C0578-2B4E-432E-968C-667FA95B2489}">
-  <ds:schemaRefs>
-    <ds:schemaRef ds:uri="http://schemas.microsoft.com/VisualStudio/2011/storyboarding/control"/>
-  </ds:schemaRefs>
-</ds:datastoreItem>
-</file>
-
-<file path=customXml/itemProps41.xml><?xml version="1.0" encoding="utf-8"?>
-<ds:datastoreItem xmlns:ds="http://schemas.openxmlformats.org/officeDocument/2006/customXml" ds:itemID="{BC28F8BE-A3BE-4032-9F57-785B1050D311}">
-  <ds:schemaRefs>
-    <ds:schemaRef ds:uri="http://schemas.microsoft.com/VisualStudio/2011/storyboarding/control"/>
-  </ds:schemaRefs>
-</ds:datastoreItem>
-</file>
-
-<file path=customXml/itemProps42.xml><?xml version="1.0" encoding="utf-8"?>
+<file path=customXml/itemProps5.xml><?xml version="1.0" encoding="utf-8"?>
 <ds:datastoreItem xmlns:ds="http://schemas.openxmlformats.org/officeDocument/2006/customXml" ds:itemID="{FB64AA66-1958-4E36-987D-6A7EFC927070}">
   <ds:schemaRefs>
     <ds:schemaRef ds:uri="http://schemas.microsoft.com/VisualStudio/2011/storyboarding/control"/>
@@ -21627,31 +21696,7 @@
 </ds:datastoreItem>
 </file>
 
-<file path=customXml/itemProps43.xml><?xml version="1.0" encoding="utf-8"?>
-<ds:datastoreItem xmlns:ds="http://schemas.openxmlformats.org/officeDocument/2006/customXml" ds:itemID="{228CCE8E-5AB4-4176-A946-269F97A1938B}">
-  <ds:schemaRefs>
-    <ds:schemaRef ds:uri="http://schemas.microsoft.com/VisualStudio/2011/storyboarding/control"/>
-  </ds:schemaRefs>
-</ds:datastoreItem>
-</file>
-
-<file path=customXml/itemProps44.xml><?xml version="1.0" encoding="utf-8"?>
-<ds:datastoreItem xmlns:ds="http://schemas.openxmlformats.org/officeDocument/2006/customXml" ds:itemID="{87E3A964-C784-4831-838C-1341082CA0D0}">
-  <ds:schemaRefs>
-    <ds:schemaRef ds:uri="http://schemas.microsoft.com/VisualStudio/2011/storyboarding/control"/>
-  </ds:schemaRefs>
-</ds:datastoreItem>
-</file>
-
-<file path=customXml/itemProps45.xml><?xml version="1.0" encoding="utf-8"?>
-<ds:datastoreItem xmlns:ds="http://schemas.openxmlformats.org/officeDocument/2006/customXml" ds:itemID="{197E03B2-12EA-4AE5-A658-AEFB4A4969F0}">
-  <ds:schemaRefs>
-    <ds:schemaRef ds:uri="http://schemas.microsoft.com/VisualStudio/2011/storyboarding/control"/>
-  </ds:schemaRefs>
-</ds:datastoreItem>
-</file>
-
-<file path=customXml/itemProps46.xml><?xml version="1.0" encoding="utf-8"?>
+<file path=customXml/itemProps50.xml><?xml version="1.0" encoding="utf-8"?>
 <ds:datastoreItem xmlns:ds="http://schemas.openxmlformats.org/officeDocument/2006/customXml" ds:itemID="{4EB8F6EA-D77B-4E98-AFF9-7F966884DAE9}">
   <ds:schemaRefs>
     <ds:schemaRef ds:uri="http://schemas.microsoft.com/VisualStudio/2011/storyboarding/control"/>
@@ -21659,48 +21704,8 @@
 </ds:datastoreItem>
 </file>
 
-<file path=customXml/itemProps47.xml><?xml version="1.0" encoding="utf-8"?>
-<ds:datastoreItem xmlns:ds="http://schemas.openxmlformats.org/officeDocument/2006/customXml" ds:itemID="{278D73A4-36BD-4603-835C-96041F9EA73C}">
-  <ds:schemaRefs>
-    <ds:schemaRef ds:uri="http://schemas.microsoft.com/VisualStudio/2011/storyboarding/control"/>
-  </ds:schemaRefs>
-</ds:datastoreItem>
-</file>
-
-<file path=customXml/itemProps48.xml><?xml version="1.0" encoding="utf-8"?>
-<ds:datastoreItem xmlns:ds="http://schemas.openxmlformats.org/officeDocument/2006/customXml" ds:itemID="{6087D994-5CAD-448E-A469-B702B1A8D395}">
-  <ds:schemaRefs>
-    <ds:schemaRef ds:uri="http://schemas.microsoft.com/VisualStudio/2011/storyboarding/control"/>
-  </ds:schemaRefs>
-</ds:datastoreItem>
-</file>
-
-<file path=customXml/itemProps49.xml><?xml version="1.0" encoding="utf-8"?>
-<ds:datastoreItem xmlns:ds="http://schemas.openxmlformats.org/officeDocument/2006/customXml" ds:itemID="{E9B55EB0-6045-49E2-8FB5-1634C178BF34}">
-  <ds:schemaRefs>
-    <ds:schemaRef ds:uri="http://schemas.microsoft.com/VisualStudio/2011/storyboarding/control"/>
-  </ds:schemaRefs>
-</ds:datastoreItem>
-</file>
-
-<file path=customXml/itemProps5.xml><?xml version="1.0" encoding="utf-8"?>
-<ds:datastoreItem xmlns:ds="http://schemas.openxmlformats.org/officeDocument/2006/customXml" ds:itemID="{487FC4D0-890B-4EEE-BCEF-57C18A3D7FC7}">
-  <ds:schemaRefs>
-    <ds:schemaRef ds:uri="http://schemas.microsoft.com/VisualStudio/2011/storyboarding/control"/>
-  </ds:schemaRefs>
-</ds:datastoreItem>
-</file>
-
-<file path=customXml/itemProps50.xml><?xml version="1.0" encoding="utf-8"?>
-<ds:datastoreItem xmlns:ds="http://schemas.openxmlformats.org/officeDocument/2006/customXml" ds:itemID="{D55B1667-92DF-42D7-996E-169E05E811E9}">
-  <ds:schemaRefs>
-    <ds:schemaRef ds:uri="http://schemas.microsoft.com/VisualStudio/2011/storyboarding/control"/>
-  </ds:schemaRefs>
-</ds:datastoreItem>
-</file>
-
 <file path=customXml/itemProps51.xml><?xml version="1.0" encoding="utf-8"?>
-<ds:datastoreItem xmlns:ds="http://schemas.openxmlformats.org/officeDocument/2006/customXml" ds:itemID="{F08FF0C8-45C8-4CCA-829E-B7E5EE935DC6}">
+<ds:datastoreItem xmlns:ds="http://schemas.openxmlformats.org/officeDocument/2006/customXml" ds:itemID="{58BAE120-0D1C-4195-9468-18A423861BB0}">
   <ds:schemaRefs>
     <ds:schemaRef ds:uri="http://schemas.microsoft.com/VisualStudio/2011/storyboarding/control"/>
   </ds:schemaRefs>
@@ -21708,7 +21713,7 @@
 </file>
 
 <file path=customXml/itemProps52.xml><?xml version="1.0" encoding="utf-8"?>
-<ds:datastoreItem xmlns:ds="http://schemas.openxmlformats.org/officeDocument/2006/customXml" ds:itemID="{B5C69DAF-B3EA-41DA-A86F-668A71D2FD96}">
+<ds:datastoreItem xmlns:ds="http://schemas.openxmlformats.org/officeDocument/2006/customXml" ds:itemID="{66BCCA39-F658-4DC1-B56C-FDD66FE60FA7}">
   <ds:schemaRefs>
     <ds:schemaRef ds:uri="http://schemas.microsoft.com/VisualStudio/2011/storyboarding/control"/>
   </ds:schemaRefs>
@@ -21716,7 +21721,7 @@
 </file>
 
 <file path=customXml/itemProps53.xml><?xml version="1.0" encoding="utf-8"?>
-<ds:datastoreItem xmlns:ds="http://schemas.openxmlformats.org/officeDocument/2006/customXml" ds:itemID="{32C4BD6A-8F35-45B9-AA1C-2E01578AB6B6}">
+<ds:datastoreItem xmlns:ds="http://schemas.openxmlformats.org/officeDocument/2006/customXml" ds:itemID="{BC28F8BE-A3BE-4032-9F57-785B1050D311}">
   <ds:schemaRefs>
     <ds:schemaRef ds:uri="http://schemas.microsoft.com/VisualStudio/2011/storyboarding/control"/>
   </ds:schemaRefs>
@@ -21732,7 +21737,7 @@
 </file>
 
 <file path=customXml/itemProps55.xml><?xml version="1.0" encoding="utf-8"?>
-<ds:datastoreItem xmlns:ds="http://schemas.openxmlformats.org/officeDocument/2006/customXml" ds:itemID="{F87BB709-CD85-445C-8BD8-9AC70B06E5DF}">
+<ds:datastoreItem xmlns:ds="http://schemas.openxmlformats.org/officeDocument/2006/customXml" ds:itemID="{D65FF5F5-FFDC-439E-8AB6-2AD4D7DA184D}">
   <ds:schemaRefs>
     <ds:schemaRef ds:uri="http://schemas.microsoft.com/VisualStudio/2011/storyboarding/control"/>
   </ds:schemaRefs>
@@ -21740,7 +21745,7 @@
 </file>
 
 <file path=customXml/itemProps56.xml><?xml version="1.0" encoding="utf-8"?>
-<ds:datastoreItem xmlns:ds="http://schemas.openxmlformats.org/officeDocument/2006/customXml" ds:itemID="{BE99DE31-AD0F-4003-9AC3-D632ED770545}">
+<ds:datastoreItem xmlns:ds="http://schemas.openxmlformats.org/officeDocument/2006/customXml" ds:itemID="{31441471-E595-4BB5-8B62-FB6EDE34E594}">
   <ds:schemaRefs>
     <ds:schemaRef ds:uri="http://schemas.microsoft.com/VisualStudio/2011/storyboarding/control"/>
   </ds:schemaRefs>
@@ -21748,6 +21753,62 @@
 </file>
 
 <file path=customXml/itemProps57.xml><?xml version="1.0" encoding="utf-8"?>
+<ds:datastoreItem xmlns:ds="http://schemas.openxmlformats.org/officeDocument/2006/customXml" ds:itemID="{56E92B91-09B2-4903-A550-3D6DCB281F5A}">
+  <ds:schemaRefs>
+    <ds:schemaRef ds:uri="http://schemas.microsoft.com/VisualStudio/2011/storyboarding/control"/>
+  </ds:schemaRefs>
+</ds:datastoreItem>
+</file>
+
+<file path=customXml/itemProps58.xml><?xml version="1.0" encoding="utf-8"?>
+<ds:datastoreItem xmlns:ds="http://schemas.openxmlformats.org/officeDocument/2006/customXml" ds:itemID="{CB8E043B-45F5-4D5B-AA27-B56B500D4A1E}">
+  <ds:schemaRefs>
+    <ds:schemaRef ds:uri="http://schemas.microsoft.com/VisualStudio/2011/storyboarding/control"/>
+  </ds:schemaRefs>
+</ds:datastoreItem>
+</file>
+
+<file path=customXml/itemProps59.xml><?xml version="1.0" encoding="utf-8"?>
+<ds:datastoreItem xmlns:ds="http://schemas.openxmlformats.org/officeDocument/2006/customXml" ds:itemID="{C648EE62-EAE8-4EA3-AF14-75FD647863E3}">
+  <ds:schemaRefs>
+    <ds:schemaRef ds:uri="http://schemas.microsoft.com/VisualStudio/2011/storyboarding/control"/>
+  </ds:schemaRefs>
+</ds:datastoreItem>
+</file>
+
+<file path=customXml/itemProps6.xml><?xml version="1.0" encoding="utf-8"?>
+<ds:datastoreItem xmlns:ds="http://schemas.openxmlformats.org/officeDocument/2006/customXml" ds:itemID="{278D73A4-36BD-4603-835C-96041F9EA73C}">
+  <ds:schemaRefs>
+    <ds:schemaRef ds:uri="http://schemas.microsoft.com/VisualStudio/2011/storyboarding/control"/>
+  </ds:schemaRefs>
+</ds:datastoreItem>
+</file>
+
+<file path=customXml/itemProps60.xml><?xml version="1.0" encoding="utf-8"?>
+<ds:datastoreItem xmlns:ds="http://schemas.openxmlformats.org/officeDocument/2006/customXml" ds:itemID="{D762AECD-FD4E-459E-9A0C-CD997B6F6CCB}">
+  <ds:schemaRefs>
+    <ds:schemaRef ds:uri="http://schemas.microsoft.com/VisualStudio/2011/storyboarding/control"/>
+  </ds:schemaRefs>
+</ds:datastoreItem>
+</file>
+
+<file path=customXml/itemProps61.xml><?xml version="1.0" encoding="utf-8"?>
+<ds:datastoreItem xmlns:ds="http://schemas.openxmlformats.org/officeDocument/2006/customXml" ds:itemID="{A2B888DF-84F5-42B1-B224-CCFB037705D5}">
+  <ds:schemaRefs>
+    <ds:schemaRef ds:uri="http://schemas.microsoft.com/VisualStudio/2011/storyboarding/control"/>
+  </ds:schemaRefs>
+</ds:datastoreItem>
+</file>
+
+<file path=customXml/itemProps62.xml><?xml version="1.0" encoding="utf-8"?>
+<ds:datastoreItem xmlns:ds="http://schemas.openxmlformats.org/officeDocument/2006/customXml" ds:itemID="{E9B55EB0-6045-49E2-8FB5-1634C178BF34}">
+  <ds:schemaRefs>
+    <ds:schemaRef ds:uri="http://schemas.microsoft.com/VisualStudio/2011/storyboarding/control"/>
+  </ds:schemaRefs>
+</ds:datastoreItem>
+</file>
+
+<file path=customXml/itemProps63.xml><?xml version="1.0" encoding="utf-8"?>
 <ds:datastoreItem xmlns:ds="http://schemas.openxmlformats.org/officeDocument/2006/customXml" ds:itemID="{A4FAA298-94DD-47AD-B3F1-33DE6023CB7D}">
   <ds:schemaRefs>
     <ds:schemaRef ds:uri="http://schemas.microsoft.com/VisualStudio/2011/storyboarding/control"/>
@@ -21755,55 +21816,15 @@
 </ds:datastoreItem>
 </file>
 
-<file path=customXml/itemProps58.xml><?xml version="1.0" encoding="utf-8"?>
-<ds:datastoreItem xmlns:ds="http://schemas.openxmlformats.org/officeDocument/2006/customXml" ds:itemID="{F0C6452F-C1D8-4C0A-9BB1-E8C6CED0E975}">
+<file path=customXml/itemProps64.xml><?xml version="1.0" encoding="utf-8"?>
+<ds:datastoreItem xmlns:ds="http://schemas.openxmlformats.org/officeDocument/2006/customXml" ds:itemID="{68E9C494-82F9-44D0-ABAB-FDCCB51BB4E7}">
   <ds:schemaRefs>
     <ds:schemaRef ds:uri="http://schemas.microsoft.com/VisualStudio/2011/storyboarding/control"/>
   </ds:schemaRefs>
 </ds:datastoreItem>
 </file>
 
-<file path=customXml/itemProps59.xml><?xml version="1.0" encoding="utf-8"?>
-<ds:datastoreItem xmlns:ds="http://schemas.openxmlformats.org/officeDocument/2006/customXml" ds:itemID="{58BAE120-0D1C-4195-9468-18A423861BB0}">
-  <ds:schemaRefs>
-    <ds:schemaRef ds:uri="http://schemas.microsoft.com/VisualStudio/2011/storyboarding/control"/>
-  </ds:schemaRefs>
-</ds:datastoreItem>
-</file>
-
-<file path=customXml/itemProps6.xml><?xml version="1.0" encoding="utf-8"?>
-<ds:datastoreItem xmlns:ds="http://schemas.openxmlformats.org/officeDocument/2006/customXml" ds:itemID="{56E92B91-09B2-4903-A550-3D6DCB281F5A}">
-  <ds:schemaRefs>
-    <ds:schemaRef ds:uri="http://schemas.microsoft.com/VisualStudio/2011/storyboarding/control"/>
-  </ds:schemaRefs>
-</ds:datastoreItem>
-</file>
-
-<file path=customXml/itemProps60.xml><?xml version="1.0" encoding="utf-8"?>
-<ds:datastoreItem xmlns:ds="http://schemas.openxmlformats.org/officeDocument/2006/customXml" ds:itemID="{B1F3A6E5-9671-4EF1-8CCC-623FA6A2DE7F}">
-  <ds:schemaRefs>
-    <ds:schemaRef ds:uri="http://schemas.microsoft.com/VisualStudio/2011/storyboarding/control"/>
-  </ds:schemaRefs>
-</ds:datastoreItem>
-</file>
-
-<file path=customXml/itemProps61.xml><?xml version="1.0" encoding="utf-8"?>
-<ds:datastoreItem xmlns:ds="http://schemas.openxmlformats.org/officeDocument/2006/customXml" ds:itemID="{840C981A-06A9-4180-8908-1CD3C44EBB7B}">
-  <ds:schemaRefs>
-    <ds:schemaRef ds:uri="http://schemas.microsoft.com/VisualStudio/2011/storyboarding/control"/>
-  </ds:schemaRefs>
-</ds:datastoreItem>
-</file>
-
-<file path=customXml/itemProps62.xml><?xml version="1.0" encoding="utf-8"?>
-<ds:datastoreItem xmlns:ds="http://schemas.openxmlformats.org/officeDocument/2006/customXml" ds:itemID="{D65FF5F5-FFDC-439E-8AB6-2AD4D7DA184D}">
-  <ds:schemaRefs>
-    <ds:schemaRef ds:uri="http://schemas.microsoft.com/VisualStudio/2011/storyboarding/control"/>
-  </ds:schemaRefs>
-</ds:datastoreItem>
-</file>
-
-<file path=customXml/itemProps63.xml><?xml version="1.0" encoding="utf-8"?>
+<file path=customXml/itemProps7.xml><?xml version="1.0" encoding="utf-8"?>
 <ds:datastoreItem xmlns:ds="http://schemas.openxmlformats.org/officeDocument/2006/customXml" ds:itemID="{FAB8CF5E-613B-4981-9947-D43431AE567C}">
   <ds:schemaRefs>
     <ds:schemaRef ds:uri="http://schemas.microsoft.com/VisualStudio/2011/storyboarding/control"/>
@@ -21811,24 +21832,8 @@
 </ds:datastoreItem>
 </file>
 
-<file path=customXml/itemProps64.xml><?xml version="1.0" encoding="utf-8"?>
-<ds:datastoreItem xmlns:ds="http://schemas.openxmlformats.org/officeDocument/2006/customXml" ds:itemID="{0C895A0F-3651-43E7-96FD-1DEB79535254}">
-  <ds:schemaRefs>
-    <ds:schemaRef ds:uri="http://schemas.microsoft.com/VisualStudio/2011/storyboarding/control"/>
-  </ds:schemaRefs>
-</ds:datastoreItem>
-</file>
-
-<file path=customXml/itemProps7.xml><?xml version="1.0" encoding="utf-8"?>
-<ds:datastoreItem xmlns:ds="http://schemas.openxmlformats.org/officeDocument/2006/customXml" ds:itemID="{2D86EF9B-4DC9-4A7E-8199-7E5A5709B3F9}">
-  <ds:schemaRefs>
-    <ds:schemaRef ds:uri="http://schemas.microsoft.com/VisualStudio/2011/storyboarding/control"/>
-  </ds:schemaRefs>
-</ds:datastoreItem>
-</file>
-
 <file path=customXml/itemProps8.xml><?xml version="1.0" encoding="utf-8"?>
-<ds:datastoreItem xmlns:ds="http://schemas.openxmlformats.org/officeDocument/2006/customXml" ds:itemID="{0A25B352-A0FD-4760-8CF9-51B50D49D5E9}">
+<ds:datastoreItem xmlns:ds="http://schemas.openxmlformats.org/officeDocument/2006/customXml" ds:itemID="{40324C11-64C9-495C-B044-F613A3EF9F29}">
   <ds:schemaRefs>
     <ds:schemaRef ds:uri="http://schemas.microsoft.com/VisualStudio/2011/storyboarding/control"/>
   </ds:schemaRefs>
@@ -21836,7 +21841,7 @@
 </file>
 
 <file path=customXml/itemProps9.xml><?xml version="1.0" encoding="utf-8"?>
-<ds:datastoreItem xmlns:ds="http://schemas.openxmlformats.org/officeDocument/2006/customXml" ds:itemID="{956B4365-E045-42E9-A789-1D28723D04C7}">
+<ds:datastoreItem xmlns:ds="http://schemas.openxmlformats.org/officeDocument/2006/customXml" ds:itemID="{D55B1667-92DF-42D7-996E-169E05E811E9}">
   <ds:schemaRefs>
     <ds:schemaRef ds:uri="http://schemas.microsoft.com/VisualStudio/2011/storyboarding/control"/>
   </ds:schemaRefs>

</xml_diff>